<commit_message>
After parallelizing inner loop over community: BerkStan
</commit_message>
<xml_diff>
--- a/Results.pptx
+++ b/Results.pptx
@@ -265,7 +265,7 @@
           <a:p>
             <a:fld id="{24B5462C-CF72-42E4-8C2B-C6088A8FDAE8}" type="datetimeFigureOut">
               <a:rPr lang="en-IN" smtClean="0"/>
-              <a:t>11-07-2021</a:t>
+              <a:t>19-07-2021</a:t>
             </a:fld>
             <a:endParaRPr lang="en-IN"/>
           </a:p>
@@ -465,7 +465,7 @@
           <a:p>
             <a:fld id="{24B5462C-CF72-42E4-8C2B-C6088A8FDAE8}" type="datetimeFigureOut">
               <a:rPr lang="en-IN" smtClean="0"/>
-              <a:t>11-07-2021</a:t>
+              <a:t>19-07-2021</a:t>
             </a:fld>
             <a:endParaRPr lang="en-IN"/>
           </a:p>
@@ -675,7 +675,7 @@
           <a:p>
             <a:fld id="{24B5462C-CF72-42E4-8C2B-C6088A8FDAE8}" type="datetimeFigureOut">
               <a:rPr lang="en-IN" smtClean="0"/>
-              <a:t>11-07-2021</a:t>
+              <a:t>19-07-2021</a:t>
             </a:fld>
             <a:endParaRPr lang="en-IN"/>
           </a:p>
@@ -875,7 +875,7 @@
           <a:p>
             <a:fld id="{24B5462C-CF72-42E4-8C2B-C6088A8FDAE8}" type="datetimeFigureOut">
               <a:rPr lang="en-IN" smtClean="0"/>
-              <a:t>11-07-2021</a:t>
+              <a:t>19-07-2021</a:t>
             </a:fld>
             <a:endParaRPr lang="en-IN"/>
           </a:p>
@@ -1151,7 +1151,7 @@
           <a:p>
             <a:fld id="{24B5462C-CF72-42E4-8C2B-C6088A8FDAE8}" type="datetimeFigureOut">
               <a:rPr lang="en-IN" smtClean="0"/>
-              <a:t>11-07-2021</a:t>
+              <a:t>19-07-2021</a:t>
             </a:fld>
             <a:endParaRPr lang="en-IN"/>
           </a:p>
@@ -1419,7 +1419,7 @@
           <a:p>
             <a:fld id="{24B5462C-CF72-42E4-8C2B-C6088A8FDAE8}" type="datetimeFigureOut">
               <a:rPr lang="en-IN" smtClean="0"/>
-              <a:t>11-07-2021</a:t>
+              <a:t>19-07-2021</a:t>
             </a:fld>
             <a:endParaRPr lang="en-IN"/>
           </a:p>
@@ -1834,7 +1834,7 @@
           <a:p>
             <a:fld id="{24B5462C-CF72-42E4-8C2B-C6088A8FDAE8}" type="datetimeFigureOut">
               <a:rPr lang="en-IN" smtClean="0"/>
-              <a:t>11-07-2021</a:t>
+              <a:t>19-07-2021</a:t>
             </a:fld>
             <a:endParaRPr lang="en-IN"/>
           </a:p>
@@ -1976,7 +1976,7 @@
           <a:p>
             <a:fld id="{24B5462C-CF72-42E4-8C2B-C6088A8FDAE8}" type="datetimeFigureOut">
               <a:rPr lang="en-IN" smtClean="0"/>
-              <a:t>11-07-2021</a:t>
+              <a:t>19-07-2021</a:t>
             </a:fld>
             <a:endParaRPr lang="en-IN"/>
           </a:p>
@@ -2089,7 +2089,7 @@
           <a:p>
             <a:fld id="{24B5462C-CF72-42E4-8C2B-C6088A8FDAE8}" type="datetimeFigureOut">
               <a:rPr lang="en-IN" smtClean="0"/>
-              <a:t>11-07-2021</a:t>
+              <a:t>19-07-2021</a:t>
             </a:fld>
             <a:endParaRPr lang="en-IN"/>
           </a:p>
@@ -2402,7 +2402,7 @@
           <a:p>
             <a:fld id="{24B5462C-CF72-42E4-8C2B-C6088A8FDAE8}" type="datetimeFigureOut">
               <a:rPr lang="en-IN" smtClean="0"/>
-              <a:t>11-07-2021</a:t>
+              <a:t>19-07-2021</a:t>
             </a:fld>
             <a:endParaRPr lang="en-IN"/>
           </a:p>
@@ -2691,7 +2691,7 @@
           <a:p>
             <a:fld id="{24B5462C-CF72-42E4-8C2B-C6088A8FDAE8}" type="datetimeFigureOut">
               <a:rPr lang="en-IN" smtClean="0"/>
-              <a:t>11-07-2021</a:t>
+              <a:t>19-07-2021</a:t>
             </a:fld>
             <a:endParaRPr lang="en-IN"/>
           </a:p>
@@ -2934,7 +2934,7 @@
           <a:p>
             <a:fld id="{24B5462C-CF72-42E4-8C2B-C6088A8FDAE8}" type="datetimeFigureOut">
               <a:rPr lang="en-IN" smtClean="0"/>
-              <a:t>11-07-2021</a:t>
+              <a:t>19-07-2021</a:t>
             </a:fld>
             <a:endParaRPr lang="en-IN"/>
           </a:p>
@@ -3665,10 +3665,10 @@
       </p:pic>
       <p:pic>
         <p:nvPicPr>
-          <p:cNvPr id="6" name="Picture 5" descr="A picture containing text, writing implement, stationary, pencil&#10;&#10;Description automatically generated">
-            <a:extLst>
-              <a:ext uri="{FF2B5EF4-FFF2-40B4-BE49-F238E27FC236}">
-                <a16:creationId xmlns:a16="http://schemas.microsoft.com/office/drawing/2014/main" id="{ED03B7E1-8B55-460F-9AB4-C6CC050A55C3}"/>
+          <p:cNvPr id="5" name="Picture 4" descr="Chart&#10;&#10;Description automatically generated">
+            <a:extLst>
+              <a:ext uri="{FF2B5EF4-FFF2-40B4-BE49-F238E27FC236}">
+                <a16:creationId xmlns:a16="http://schemas.microsoft.com/office/drawing/2014/main" id="{6FED378D-16EE-4B56-8A7C-44EA274DA0CE}"/>
               </a:ext>
             </a:extLst>
           </p:cNvPr>
@@ -3691,7 +3691,7 @@
         </p:blipFill>
         <p:spPr>
           <a:xfrm>
-            <a:off x="6309069" y="1324988"/>
+            <a:off x="6095999" y="1324988"/>
             <a:ext cx="5486411" cy="3657607"/>
           </a:xfrm>
           <a:prstGeom prst="rect">

</xml_diff>

<commit_message>
Seed vs Comm size (sorted comm size): BerkStan. Updated ppt
</commit_message>
<xml_diff>
--- a/Results.pptx
+++ b/Results.pptx
@@ -10,6 +10,8 @@
     <p:sldId id="259" r:id="rId4"/>
     <p:sldId id="257" r:id="rId5"/>
     <p:sldId id="260" r:id="rId6"/>
+    <p:sldId id="261" r:id="rId7"/>
+    <p:sldId id="262" r:id="rId8"/>
   </p:sldIdLst>
   <p:sldSz cx="12192000" cy="6858000"/>
   <p:notesSz cx="6858000" cy="9144000"/>
@@ -265,7 +267,7 @@
           <a:p>
             <a:fld id="{24B5462C-CF72-42E4-8C2B-C6088A8FDAE8}" type="datetimeFigureOut">
               <a:rPr lang="en-IN" smtClean="0"/>
-              <a:t>19-07-2021</a:t>
+              <a:t>21-07-2021</a:t>
             </a:fld>
             <a:endParaRPr lang="en-IN"/>
           </a:p>
@@ -465,7 +467,7 @@
           <a:p>
             <a:fld id="{24B5462C-CF72-42E4-8C2B-C6088A8FDAE8}" type="datetimeFigureOut">
               <a:rPr lang="en-IN" smtClean="0"/>
-              <a:t>19-07-2021</a:t>
+              <a:t>21-07-2021</a:t>
             </a:fld>
             <a:endParaRPr lang="en-IN"/>
           </a:p>
@@ -675,7 +677,7 @@
           <a:p>
             <a:fld id="{24B5462C-CF72-42E4-8C2B-C6088A8FDAE8}" type="datetimeFigureOut">
               <a:rPr lang="en-IN" smtClean="0"/>
-              <a:t>19-07-2021</a:t>
+              <a:t>21-07-2021</a:t>
             </a:fld>
             <a:endParaRPr lang="en-IN"/>
           </a:p>
@@ -875,7 +877,7 @@
           <a:p>
             <a:fld id="{24B5462C-CF72-42E4-8C2B-C6088A8FDAE8}" type="datetimeFigureOut">
               <a:rPr lang="en-IN" smtClean="0"/>
-              <a:t>19-07-2021</a:t>
+              <a:t>21-07-2021</a:t>
             </a:fld>
             <a:endParaRPr lang="en-IN"/>
           </a:p>
@@ -1151,7 +1153,7 @@
           <a:p>
             <a:fld id="{24B5462C-CF72-42E4-8C2B-C6088A8FDAE8}" type="datetimeFigureOut">
               <a:rPr lang="en-IN" smtClean="0"/>
-              <a:t>19-07-2021</a:t>
+              <a:t>21-07-2021</a:t>
             </a:fld>
             <a:endParaRPr lang="en-IN"/>
           </a:p>
@@ -1419,7 +1421,7 @@
           <a:p>
             <a:fld id="{24B5462C-CF72-42E4-8C2B-C6088A8FDAE8}" type="datetimeFigureOut">
               <a:rPr lang="en-IN" smtClean="0"/>
-              <a:t>19-07-2021</a:t>
+              <a:t>21-07-2021</a:t>
             </a:fld>
             <a:endParaRPr lang="en-IN"/>
           </a:p>
@@ -1834,7 +1836,7 @@
           <a:p>
             <a:fld id="{24B5462C-CF72-42E4-8C2B-C6088A8FDAE8}" type="datetimeFigureOut">
               <a:rPr lang="en-IN" smtClean="0"/>
-              <a:t>19-07-2021</a:t>
+              <a:t>21-07-2021</a:t>
             </a:fld>
             <a:endParaRPr lang="en-IN"/>
           </a:p>
@@ -1976,7 +1978,7 @@
           <a:p>
             <a:fld id="{24B5462C-CF72-42E4-8C2B-C6088A8FDAE8}" type="datetimeFigureOut">
               <a:rPr lang="en-IN" smtClean="0"/>
-              <a:t>19-07-2021</a:t>
+              <a:t>21-07-2021</a:t>
             </a:fld>
             <a:endParaRPr lang="en-IN"/>
           </a:p>
@@ -2089,7 +2091,7 @@
           <a:p>
             <a:fld id="{24B5462C-CF72-42E4-8C2B-C6088A8FDAE8}" type="datetimeFigureOut">
               <a:rPr lang="en-IN" smtClean="0"/>
-              <a:t>19-07-2021</a:t>
+              <a:t>21-07-2021</a:t>
             </a:fld>
             <a:endParaRPr lang="en-IN"/>
           </a:p>
@@ -2402,7 +2404,7 @@
           <a:p>
             <a:fld id="{24B5462C-CF72-42E4-8C2B-C6088A8FDAE8}" type="datetimeFigureOut">
               <a:rPr lang="en-IN" smtClean="0"/>
-              <a:t>19-07-2021</a:t>
+              <a:t>21-07-2021</a:t>
             </a:fld>
             <a:endParaRPr lang="en-IN"/>
           </a:p>
@@ -2691,7 +2693,7 @@
           <a:p>
             <a:fld id="{24B5462C-CF72-42E4-8C2B-C6088A8FDAE8}" type="datetimeFigureOut">
               <a:rPr lang="en-IN" smtClean="0"/>
-              <a:t>19-07-2021</a:t>
+              <a:t>21-07-2021</a:t>
             </a:fld>
             <a:endParaRPr lang="en-IN"/>
           </a:p>
@@ -2934,7 +2936,7 @@
           <a:p>
             <a:fld id="{24B5462C-CF72-42E4-8C2B-C6088A8FDAE8}" type="datetimeFigureOut">
               <a:rPr lang="en-IN" smtClean="0"/>
-              <a:t>19-07-2021</a:t>
+              <a:t>21-07-2021</a:t>
             </a:fld>
             <a:endParaRPr lang="en-IN"/>
           </a:p>
@@ -4925,6 +4927,354 @@
 </p:sld>
 </file>
 
+<file path=ppt/slides/slide6.xml><?xml version="1.0" encoding="utf-8"?>
+<p:sld xmlns:a="http://schemas.openxmlformats.org/drawingml/2006/main" xmlns:r="http://schemas.openxmlformats.org/officeDocument/2006/relationships" xmlns:p="http://schemas.openxmlformats.org/presentationml/2006/main">
+  <p:cSld>
+    <p:spTree>
+      <p:nvGrpSpPr>
+        <p:cNvPr id="1" name=""/>
+        <p:cNvGrpSpPr/>
+        <p:nvPr/>
+      </p:nvGrpSpPr>
+      <p:grpSpPr>
+        <a:xfrm>
+          <a:off x="0" y="0"/>
+          <a:ext cx="0" cy="0"/>
+          <a:chOff x="0" y="0"/>
+          <a:chExt cx="0" cy="0"/>
+        </a:xfrm>
+      </p:grpSpPr>
+      <p:sp>
+        <p:nvSpPr>
+          <p:cNvPr id="2" name="TextBox 1">
+            <a:extLst>
+              <a:ext uri="{FF2B5EF4-FFF2-40B4-BE49-F238E27FC236}">
+                <a16:creationId xmlns:a16="http://schemas.microsoft.com/office/drawing/2014/main" id="{99BBDD43-3208-49A0-AE89-F20EE9ABC584}"/>
+              </a:ext>
+            </a:extLst>
+          </p:cNvPr>
+          <p:cNvSpPr txBox="1"/>
+          <p:nvPr/>
+        </p:nvSpPr>
+        <p:spPr>
+          <a:xfrm>
+            <a:off x="3154874" y="532660"/>
+            <a:ext cx="5882251" cy="369332"/>
+          </a:xfrm>
+          <a:prstGeom prst="rect">
+            <a:avLst/>
+          </a:prstGeom>
+          <a:noFill/>
+        </p:spPr>
+        <p:txBody>
+          <a:bodyPr wrap="none" rtlCol="0">
+            <a:spAutoFit/>
+          </a:bodyPr>
+          <a:lstStyle/>
+          <a:p>
+            <a:r>
+              <a:rPr lang="en-US" dirty="0"/>
+              <a:t>Seed Distribution Across Communities: IMM vs Louvain-IMM</a:t>
+            </a:r>
+            <a:endParaRPr lang="en-IN" dirty="0"/>
+          </a:p>
+        </p:txBody>
+      </p:sp>
+      <p:pic>
+        <p:nvPicPr>
+          <p:cNvPr id="4" name="Picture 3" descr="Chart, histogram&#10;&#10;Description automatically generated">
+            <a:extLst>
+              <a:ext uri="{FF2B5EF4-FFF2-40B4-BE49-F238E27FC236}">
+                <a16:creationId xmlns:a16="http://schemas.microsoft.com/office/drawing/2014/main" id="{387BBA3E-EFD8-4AD2-A9BE-3CBE322E8A5B}"/>
+              </a:ext>
+            </a:extLst>
+          </p:cNvPr>
+          <p:cNvPicPr>
+            <a:picLocks noChangeAspect="1"/>
+          </p:cNvPicPr>
+          <p:nvPr/>
+        </p:nvPicPr>
+        <p:blipFill>
+          <a:blip r:embed="rId2">
+            <a:extLst>
+              <a:ext uri="{28A0092B-C50C-407E-A947-70E740481C1C}">
+                <a14:useLocalDpi xmlns:a14="http://schemas.microsoft.com/office/drawing/2010/main" val="0"/>
+              </a:ext>
+            </a:extLst>
+          </a:blip>
+          <a:stretch>
+            <a:fillRect/>
+          </a:stretch>
+        </p:blipFill>
+        <p:spPr>
+          <a:xfrm>
+            <a:off x="609588" y="1600196"/>
+            <a:ext cx="5486411" cy="3657607"/>
+          </a:xfrm>
+          <a:prstGeom prst="rect">
+            <a:avLst/>
+          </a:prstGeom>
+        </p:spPr>
+      </p:pic>
+      <p:pic>
+        <p:nvPicPr>
+          <p:cNvPr id="6" name="Picture 5" descr="A picture containing graphical user interface&#10;&#10;Description automatically generated">
+            <a:extLst>
+              <a:ext uri="{FF2B5EF4-FFF2-40B4-BE49-F238E27FC236}">
+                <a16:creationId xmlns:a16="http://schemas.microsoft.com/office/drawing/2014/main" id="{5C5F7BE0-BEF0-40D5-A845-F8929BBF09C7}"/>
+              </a:ext>
+            </a:extLst>
+          </p:cNvPr>
+          <p:cNvPicPr>
+            <a:picLocks noChangeAspect="1"/>
+          </p:cNvPicPr>
+          <p:nvPr/>
+        </p:nvPicPr>
+        <p:blipFill>
+          <a:blip r:embed="rId3">
+            <a:extLst>
+              <a:ext uri="{28A0092B-C50C-407E-A947-70E740481C1C}">
+                <a14:useLocalDpi xmlns:a14="http://schemas.microsoft.com/office/drawing/2010/main" val="0"/>
+              </a:ext>
+            </a:extLst>
+          </a:blip>
+          <a:stretch>
+            <a:fillRect/>
+          </a:stretch>
+        </p:blipFill>
+        <p:spPr>
+          <a:xfrm>
+            <a:off x="6095999" y="1600196"/>
+            <a:ext cx="5486411" cy="3657607"/>
+          </a:xfrm>
+          <a:prstGeom prst="rect">
+            <a:avLst/>
+          </a:prstGeom>
+        </p:spPr>
+      </p:pic>
+    </p:spTree>
+    <p:extLst>
+      <p:ext uri="{BB962C8B-B14F-4D97-AF65-F5344CB8AC3E}">
+        <p14:creationId xmlns:p14="http://schemas.microsoft.com/office/powerpoint/2010/main" val="2450227819"/>
+      </p:ext>
+    </p:extLst>
+  </p:cSld>
+  <p:clrMapOvr>
+    <a:masterClrMapping/>
+  </p:clrMapOvr>
+</p:sld>
+</file>
+
+<file path=ppt/slides/slide7.xml><?xml version="1.0" encoding="utf-8"?>
+<p:sld xmlns:a="http://schemas.openxmlformats.org/drawingml/2006/main" xmlns:r="http://schemas.openxmlformats.org/officeDocument/2006/relationships" xmlns:p="http://schemas.openxmlformats.org/presentationml/2006/main">
+  <p:cSld>
+    <p:spTree>
+      <p:nvGrpSpPr>
+        <p:cNvPr id="1" name=""/>
+        <p:cNvGrpSpPr/>
+        <p:nvPr/>
+      </p:nvGrpSpPr>
+      <p:grpSpPr>
+        <a:xfrm>
+          <a:off x="0" y="0"/>
+          <a:ext cx="0" cy="0"/>
+          <a:chOff x="0" y="0"/>
+          <a:chExt cx="0" cy="0"/>
+        </a:xfrm>
+      </p:grpSpPr>
+      <p:pic>
+        <p:nvPicPr>
+          <p:cNvPr id="3" name="Picture 2" descr="Chart, line chart&#10;&#10;Description automatically generated">
+            <a:extLst>
+              <a:ext uri="{FF2B5EF4-FFF2-40B4-BE49-F238E27FC236}">
+                <a16:creationId xmlns:a16="http://schemas.microsoft.com/office/drawing/2014/main" id="{9DADAC30-29D1-4998-B015-91BF696DDB1F}"/>
+              </a:ext>
+            </a:extLst>
+          </p:cNvPr>
+          <p:cNvPicPr>
+            <a:picLocks noChangeAspect="1"/>
+          </p:cNvPicPr>
+          <p:nvPr/>
+        </p:nvPicPr>
+        <p:blipFill>
+          <a:blip r:embed="rId2">
+            <a:extLst>
+              <a:ext uri="{28A0092B-C50C-407E-A947-70E740481C1C}">
+                <a14:useLocalDpi xmlns:a14="http://schemas.microsoft.com/office/drawing/2010/main" val="0"/>
+              </a:ext>
+            </a:extLst>
+          </a:blip>
+          <a:stretch>
+            <a:fillRect/>
+          </a:stretch>
+        </p:blipFill>
+        <p:spPr>
+          <a:xfrm>
+            <a:off x="805251" y="64358"/>
+            <a:ext cx="4814662" cy="3209774"/>
+          </a:xfrm>
+          <a:prstGeom prst="rect">
+            <a:avLst/>
+          </a:prstGeom>
+        </p:spPr>
+      </p:pic>
+      <p:pic>
+        <p:nvPicPr>
+          <p:cNvPr id="5" name="Picture 4" descr="Chart, line chart&#10;&#10;Description automatically generated">
+            <a:extLst>
+              <a:ext uri="{FF2B5EF4-FFF2-40B4-BE49-F238E27FC236}">
+                <a16:creationId xmlns:a16="http://schemas.microsoft.com/office/drawing/2014/main" id="{B127523A-D237-4ED1-9D37-973431E2917E}"/>
+              </a:ext>
+            </a:extLst>
+          </p:cNvPr>
+          <p:cNvPicPr>
+            <a:picLocks noChangeAspect="1"/>
+          </p:cNvPicPr>
+          <p:nvPr/>
+        </p:nvPicPr>
+        <p:blipFill>
+          <a:blip r:embed="rId3">
+            <a:extLst>
+              <a:ext uri="{28A0092B-C50C-407E-A947-70E740481C1C}">
+                <a14:useLocalDpi xmlns:a14="http://schemas.microsoft.com/office/drawing/2010/main" val="0"/>
+              </a:ext>
+            </a:extLst>
+          </a:blip>
+          <a:stretch>
+            <a:fillRect/>
+          </a:stretch>
+        </p:blipFill>
+        <p:spPr>
+          <a:xfrm>
+            <a:off x="6618128" y="64358"/>
+            <a:ext cx="4814317" cy="3209544"/>
+          </a:xfrm>
+          <a:prstGeom prst="rect">
+            <a:avLst/>
+          </a:prstGeom>
+        </p:spPr>
+      </p:pic>
+      <p:pic>
+        <p:nvPicPr>
+          <p:cNvPr id="9" name="Picture 8" descr="A picture containing graphical user interface&#10;&#10;Description automatically generated">
+            <a:extLst>
+              <a:ext uri="{FF2B5EF4-FFF2-40B4-BE49-F238E27FC236}">
+                <a16:creationId xmlns:a16="http://schemas.microsoft.com/office/drawing/2014/main" id="{FC1979FD-65FB-4DC2-8148-8FB1BFA9C2C6}"/>
+              </a:ext>
+            </a:extLst>
+          </p:cNvPr>
+          <p:cNvPicPr>
+            <a:picLocks noChangeAspect="1"/>
+          </p:cNvPicPr>
+          <p:nvPr/>
+        </p:nvPicPr>
+        <p:blipFill>
+          <a:blip r:embed="rId4">
+            <a:extLst>
+              <a:ext uri="{28A0092B-C50C-407E-A947-70E740481C1C}">
+                <a14:useLocalDpi xmlns:a14="http://schemas.microsoft.com/office/drawing/2010/main" val="0"/>
+              </a:ext>
+            </a:extLst>
+          </a:blip>
+          <a:stretch>
+            <a:fillRect/>
+          </a:stretch>
+        </p:blipFill>
+        <p:spPr>
+          <a:xfrm>
+            <a:off x="6618129" y="3648456"/>
+            <a:ext cx="4814316" cy="3209544"/>
+          </a:xfrm>
+          <a:prstGeom prst="rect">
+            <a:avLst/>
+          </a:prstGeom>
+        </p:spPr>
+      </p:pic>
+      <p:sp>
+        <p:nvSpPr>
+          <p:cNvPr id="10" name="TextBox 9">
+            <a:extLst>
+              <a:ext uri="{FF2B5EF4-FFF2-40B4-BE49-F238E27FC236}">
+                <a16:creationId xmlns:a16="http://schemas.microsoft.com/office/drawing/2014/main" id="{3C3817A6-B87F-4367-8BE1-6C921BC989E7}"/>
+              </a:ext>
+            </a:extLst>
+          </p:cNvPr>
+          <p:cNvSpPr txBox="1"/>
+          <p:nvPr/>
+        </p:nvSpPr>
+        <p:spPr>
+          <a:xfrm>
+            <a:off x="4412202" y="3209544"/>
+            <a:ext cx="3838038" cy="369332"/>
+          </a:xfrm>
+          <a:prstGeom prst="rect">
+            <a:avLst/>
+          </a:prstGeom>
+          <a:noFill/>
+        </p:spPr>
+        <p:txBody>
+          <a:bodyPr wrap="none" rtlCol="0">
+            <a:spAutoFit/>
+          </a:bodyPr>
+          <a:lstStyle/>
+          <a:p>
+            <a:r>
+              <a:rPr lang="en-US" dirty="0"/>
+              <a:t>Sampling Effort vs Comm/Partition Size</a:t>
+            </a:r>
+            <a:endParaRPr lang="en-IN" dirty="0"/>
+          </a:p>
+        </p:txBody>
+      </p:sp>
+      <p:pic>
+        <p:nvPicPr>
+          <p:cNvPr id="12" name="Picture 11" descr="Chart, line chart&#10;&#10;Description automatically generated">
+            <a:extLst>
+              <a:ext uri="{FF2B5EF4-FFF2-40B4-BE49-F238E27FC236}">
+                <a16:creationId xmlns:a16="http://schemas.microsoft.com/office/drawing/2014/main" id="{B54E9D99-767E-425B-9D23-01EE664F24D7}"/>
+              </a:ext>
+            </a:extLst>
+          </p:cNvPr>
+          <p:cNvPicPr>
+            <a:picLocks noChangeAspect="1"/>
+          </p:cNvPicPr>
+          <p:nvPr/>
+        </p:nvPicPr>
+        <p:blipFill>
+          <a:blip r:embed="rId5">
+            <a:extLst>
+              <a:ext uri="{28A0092B-C50C-407E-A947-70E740481C1C}">
+                <a14:useLocalDpi xmlns:a14="http://schemas.microsoft.com/office/drawing/2010/main" val="0"/>
+              </a:ext>
+            </a:extLst>
+          </a:blip>
+          <a:stretch>
+            <a:fillRect/>
+          </a:stretch>
+        </p:blipFill>
+        <p:spPr>
+          <a:xfrm>
+            <a:off x="805597" y="3648456"/>
+            <a:ext cx="4814316" cy="3209544"/>
+          </a:xfrm>
+          <a:prstGeom prst="rect">
+            <a:avLst/>
+          </a:prstGeom>
+        </p:spPr>
+      </p:pic>
+    </p:spTree>
+    <p:extLst>
+      <p:ext uri="{BB962C8B-B14F-4D97-AF65-F5344CB8AC3E}">
+        <p14:creationId xmlns:p14="http://schemas.microsoft.com/office/powerpoint/2010/main" val="4234037173"/>
+      </p:ext>
+    </p:extLst>
+  </p:cSld>
+  <p:clrMapOvr>
+    <a:masterClrMapping/>
+  </p:clrMapOvr>
+</p:sld>
+</file>
+
 <file path=ppt/theme/theme1.xml><?xml version="1.0" encoding="utf-8"?>
 <a:theme xmlns:a="http://schemas.openxmlformats.org/drawingml/2006/main" name="Office Theme">
   <a:themeElements>

</xml_diff>

<commit_message>
Adjusted Sampling expected spread and time for BerkStan
</commit_message>
<xml_diff>
--- a/Results.pptx
+++ b/Results.pptx
@@ -9,9 +9,11 @@
     <p:sldId id="258" r:id="rId3"/>
     <p:sldId id="259" r:id="rId4"/>
     <p:sldId id="257" r:id="rId5"/>
-    <p:sldId id="260" r:id="rId6"/>
-    <p:sldId id="261" r:id="rId7"/>
-    <p:sldId id="262" r:id="rId8"/>
+    <p:sldId id="261" r:id="rId6"/>
+    <p:sldId id="262" r:id="rId7"/>
+    <p:sldId id="260" r:id="rId8"/>
+    <p:sldId id="263" r:id="rId9"/>
+    <p:sldId id="264" r:id="rId10"/>
   </p:sldIdLst>
   <p:sldSz cx="12192000" cy="6858000"/>
   <p:notesSz cx="6858000" cy="9144000"/>
@@ -267,7 +269,7 @@
           <a:p>
             <a:fld id="{24B5462C-CF72-42E4-8C2B-C6088A8FDAE8}" type="datetimeFigureOut">
               <a:rPr lang="en-IN" smtClean="0"/>
-              <a:t>21-07-2021</a:t>
+              <a:t>27-07-2021</a:t>
             </a:fld>
             <a:endParaRPr lang="en-IN"/>
           </a:p>
@@ -467,7 +469,7 @@
           <a:p>
             <a:fld id="{24B5462C-CF72-42E4-8C2B-C6088A8FDAE8}" type="datetimeFigureOut">
               <a:rPr lang="en-IN" smtClean="0"/>
-              <a:t>21-07-2021</a:t>
+              <a:t>27-07-2021</a:t>
             </a:fld>
             <a:endParaRPr lang="en-IN"/>
           </a:p>
@@ -677,7 +679,7 @@
           <a:p>
             <a:fld id="{24B5462C-CF72-42E4-8C2B-C6088A8FDAE8}" type="datetimeFigureOut">
               <a:rPr lang="en-IN" smtClean="0"/>
-              <a:t>21-07-2021</a:t>
+              <a:t>27-07-2021</a:t>
             </a:fld>
             <a:endParaRPr lang="en-IN"/>
           </a:p>
@@ -877,7 +879,7 @@
           <a:p>
             <a:fld id="{24B5462C-CF72-42E4-8C2B-C6088A8FDAE8}" type="datetimeFigureOut">
               <a:rPr lang="en-IN" smtClean="0"/>
-              <a:t>21-07-2021</a:t>
+              <a:t>27-07-2021</a:t>
             </a:fld>
             <a:endParaRPr lang="en-IN"/>
           </a:p>
@@ -1153,7 +1155,7 @@
           <a:p>
             <a:fld id="{24B5462C-CF72-42E4-8C2B-C6088A8FDAE8}" type="datetimeFigureOut">
               <a:rPr lang="en-IN" smtClean="0"/>
-              <a:t>21-07-2021</a:t>
+              <a:t>27-07-2021</a:t>
             </a:fld>
             <a:endParaRPr lang="en-IN"/>
           </a:p>
@@ -1421,7 +1423,7 @@
           <a:p>
             <a:fld id="{24B5462C-CF72-42E4-8C2B-C6088A8FDAE8}" type="datetimeFigureOut">
               <a:rPr lang="en-IN" smtClean="0"/>
-              <a:t>21-07-2021</a:t>
+              <a:t>27-07-2021</a:t>
             </a:fld>
             <a:endParaRPr lang="en-IN"/>
           </a:p>
@@ -1836,7 +1838,7 @@
           <a:p>
             <a:fld id="{24B5462C-CF72-42E4-8C2B-C6088A8FDAE8}" type="datetimeFigureOut">
               <a:rPr lang="en-IN" smtClean="0"/>
-              <a:t>21-07-2021</a:t>
+              <a:t>27-07-2021</a:t>
             </a:fld>
             <a:endParaRPr lang="en-IN"/>
           </a:p>
@@ -1978,7 +1980,7 @@
           <a:p>
             <a:fld id="{24B5462C-CF72-42E4-8C2B-C6088A8FDAE8}" type="datetimeFigureOut">
               <a:rPr lang="en-IN" smtClean="0"/>
-              <a:t>21-07-2021</a:t>
+              <a:t>27-07-2021</a:t>
             </a:fld>
             <a:endParaRPr lang="en-IN"/>
           </a:p>
@@ -2091,7 +2093,7 @@
           <a:p>
             <a:fld id="{24B5462C-CF72-42E4-8C2B-C6088A8FDAE8}" type="datetimeFigureOut">
               <a:rPr lang="en-IN" smtClean="0"/>
-              <a:t>21-07-2021</a:t>
+              <a:t>27-07-2021</a:t>
             </a:fld>
             <a:endParaRPr lang="en-IN"/>
           </a:p>
@@ -2404,7 +2406,7 @@
           <a:p>
             <a:fld id="{24B5462C-CF72-42E4-8C2B-C6088A8FDAE8}" type="datetimeFigureOut">
               <a:rPr lang="en-IN" smtClean="0"/>
-              <a:t>21-07-2021</a:t>
+              <a:t>27-07-2021</a:t>
             </a:fld>
             <a:endParaRPr lang="en-IN"/>
           </a:p>
@@ -2693,7 +2695,7 @@
           <a:p>
             <a:fld id="{24B5462C-CF72-42E4-8C2B-C6088A8FDAE8}" type="datetimeFigureOut">
               <a:rPr lang="en-IN" smtClean="0"/>
-              <a:t>21-07-2021</a:t>
+              <a:t>27-07-2021</a:t>
             </a:fld>
             <a:endParaRPr lang="en-IN"/>
           </a:p>
@@ -2936,7 +2938,7 @@
           <a:p>
             <a:fld id="{24B5462C-CF72-42E4-8C2B-C6088A8FDAE8}" type="datetimeFigureOut">
               <a:rPr lang="en-IN" smtClean="0"/>
-              <a:t>21-07-2021</a:t>
+              <a:t>27-07-2021</a:t>
             </a:fld>
             <a:endParaRPr lang="en-IN"/>
           </a:p>
@@ -4838,117 +4840,6 @@
           <p:cNvPr id="2" name="TextBox 1">
             <a:extLst>
               <a:ext uri="{FF2B5EF4-FFF2-40B4-BE49-F238E27FC236}">
-                <a16:creationId xmlns:a16="http://schemas.microsoft.com/office/drawing/2014/main" id="{2D9E1D27-424B-47D3-A6CD-8EA37B0AAF29}"/>
-              </a:ext>
-            </a:extLst>
-          </p:cNvPr>
-          <p:cNvSpPr txBox="1"/>
-          <p:nvPr/>
-        </p:nvSpPr>
-        <p:spPr>
-          <a:xfrm>
-            <a:off x="899513" y="1162975"/>
-            <a:ext cx="10392973" cy="1754326"/>
-          </a:xfrm>
-          <a:prstGeom prst="rect">
-            <a:avLst/>
-          </a:prstGeom>
-          <a:noFill/>
-        </p:spPr>
-        <p:txBody>
-          <a:bodyPr wrap="none" rtlCol="0">
-            <a:spAutoFit/>
-          </a:bodyPr>
-          <a:lstStyle/>
-          <a:p>
-            <a:r>
-              <a:rPr lang="en-US" dirty="0"/>
-              <a:t>To Do: </a:t>
-            </a:r>
-          </a:p>
-          <a:p>
-            <a:pPr marL="342900" indent="-342900">
-              <a:buAutoNum type="arabicPeriod"/>
-            </a:pPr>
-            <a:r>
-              <a:rPr lang="en-US" dirty="0"/>
-              <a:t>Investigate the bottleneck</a:t>
-            </a:r>
-          </a:p>
-          <a:p>
-            <a:pPr marL="342900" indent="-342900">
-              <a:buAutoNum type="arabicPeriod"/>
-            </a:pPr>
-            <a:r>
-              <a:rPr lang="en-US" dirty="0"/>
-              <a:t>Make sure that the sum of sampling effort across all communities &lt; sampling on the whole graph by IMM</a:t>
-            </a:r>
-          </a:p>
-          <a:p>
-            <a:pPr marL="342900" indent="-342900">
-              <a:buAutoNum type="arabicPeriod"/>
-            </a:pPr>
-            <a:r>
-              <a:rPr lang="en-US" dirty="0"/>
-              <a:t>Parallelize the heap update across communities</a:t>
-            </a:r>
-          </a:p>
-          <a:p>
-            <a:pPr marL="342900" indent="-342900">
-              <a:buAutoNum type="arabicPeriod"/>
-            </a:pPr>
-            <a:r>
-              <a:rPr lang="en-US" dirty="0"/>
-              <a:t>Redo the experiments after doing 1-3</a:t>
-            </a:r>
-          </a:p>
-          <a:p>
-            <a:pPr marL="342900" indent="-342900">
-              <a:buAutoNum type="arabicPeriod"/>
-            </a:pPr>
-            <a:r>
-              <a:rPr lang="en-US" dirty="0"/>
-              <a:t>Go for distributed approach if everything fails</a:t>
-            </a:r>
-            <a:endParaRPr lang="en-IN" dirty="0"/>
-          </a:p>
-        </p:txBody>
-      </p:sp>
-    </p:spTree>
-    <p:extLst>
-      <p:ext uri="{BB962C8B-B14F-4D97-AF65-F5344CB8AC3E}">
-        <p14:creationId xmlns:p14="http://schemas.microsoft.com/office/powerpoint/2010/main" val="2833896664"/>
-      </p:ext>
-    </p:extLst>
-  </p:cSld>
-  <p:clrMapOvr>
-    <a:masterClrMapping/>
-  </p:clrMapOvr>
-</p:sld>
-</file>
-
-<file path=ppt/slides/slide6.xml><?xml version="1.0" encoding="utf-8"?>
-<p:sld xmlns:a="http://schemas.openxmlformats.org/drawingml/2006/main" xmlns:r="http://schemas.openxmlformats.org/officeDocument/2006/relationships" xmlns:p="http://schemas.openxmlformats.org/presentationml/2006/main">
-  <p:cSld>
-    <p:spTree>
-      <p:nvGrpSpPr>
-        <p:cNvPr id="1" name=""/>
-        <p:cNvGrpSpPr/>
-        <p:nvPr/>
-      </p:nvGrpSpPr>
-      <p:grpSpPr>
-        <a:xfrm>
-          <a:off x="0" y="0"/>
-          <a:ext cx="0" cy="0"/>
-          <a:chOff x="0" y="0"/>
-          <a:chExt cx="0" cy="0"/>
-        </a:xfrm>
-      </p:grpSpPr>
-      <p:sp>
-        <p:nvSpPr>
-          <p:cNvPr id="2" name="TextBox 1">
-            <a:extLst>
-              <a:ext uri="{FF2B5EF4-FFF2-40B4-BE49-F238E27FC236}">
                 <a16:creationId xmlns:a16="http://schemas.microsoft.com/office/drawing/2014/main" id="{99BBDD43-3208-49A0-AE89-F20EE9ABC584}"/>
               </a:ext>
             </a:extLst>
@@ -5065,7 +4956,7 @@
 </p:sld>
 </file>
 
-<file path=ppt/slides/slide7.xml><?xml version="1.0" encoding="utf-8"?>
+<file path=ppt/slides/slide6.xml><?xml version="1.0" encoding="utf-8"?>
 <p:sld xmlns:a="http://schemas.openxmlformats.org/drawingml/2006/main" xmlns:r="http://schemas.openxmlformats.org/officeDocument/2006/relationships" xmlns:p="http://schemas.openxmlformats.org/presentationml/2006/main">
   <p:cSld>
     <p:spTree>
@@ -5266,6 +5157,528 @@
     <p:extLst>
       <p:ext uri="{BB962C8B-B14F-4D97-AF65-F5344CB8AC3E}">
         <p14:creationId xmlns:p14="http://schemas.microsoft.com/office/powerpoint/2010/main" val="4234037173"/>
+      </p:ext>
+    </p:extLst>
+  </p:cSld>
+  <p:clrMapOvr>
+    <a:masterClrMapping/>
+  </p:clrMapOvr>
+</p:sld>
+</file>
+
+<file path=ppt/slides/slide7.xml><?xml version="1.0" encoding="utf-8"?>
+<p:sld xmlns:a="http://schemas.openxmlformats.org/drawingml/2006/main" xmlns:r="http://schemas.openxmlformats.org/officeDocument/2006/relationships" xmlns:p="http://schemas.openxmlformats.org/presentationml/2006/main">
+  <p:cSld>
+    <p:spTree>
+      <p:nvGrpSpPr>
+        <p:cNvPr id="1" name=""/>
+        <p:cNvGrpSpPr/>
+        <p:nvPr/>
+      </p:nvGrpSpPr>
+      <p:grpSpPr>
+        <a:xfrm>
+          <a:off x="0" y="0"/>
+          <a:ext cx="0" cy="0"/>
+          <a:chOff x="0" y="0"/>
+          <a:chExt cx="0" cy="0"/>
+        </a:xfrm>
+      </p:grpSpPr>
+      <p:sp>
+        <p:nvSpPr>
+          <p:cNvPr id="2" name="TextBox 1">
+            <a:extLst>
+              <a:ext uri="{FF2B5EF4-FFF2-40B4-BE49-F238E27FC236}">
+                <a16:creationId xmlns:a16="http://schemas.microsoft.com/office/drawing/2014/main" id="{2D9E1D27-424B-47D3-A6CD-8EA37B0AAF29}"/>
+              </a:ext>
+            </a:extLst>
+          </p:cNvPr>
+          <p:cNvSpPr txBox="1"/>
+          <p:nvPr/>
+        </p:nvSpPr>
+        <p:spPr>
+          <a:xfrm>
+            <a:off x="899513" y="1162975"/>
+            <a:ext cx="10392973" cy="1754326"/>
+          </a:xfrm>
+          <a:prstGeom prst="rect">
+            <a:avLst/>
+          </a:prstGeom>
+          <a:noFill/>
+        </p:spPr>
+        <p:txBody>
+          <a:bodyPr wrap="none" rtlCol="0">
+            <a:spAutoFit/>
+          </a:bodyPr>
+          <a:lstStyle/>
+          <a:p>
+            <a:r>
+              <a:rPr lang="en-US" dirty="0"/>
+              <a:t>To Do: </a:t>
+            </a:r>
+          </a:p>
+          <a:p>
+            <a:pPr marL="342900" indent="-342900">
+              <a:buAutoNum type="arabicPeriod"/>
+            </a:pPr>
+            <a:r>
+              <a:rPr lang="en-US" dirty="0"/>
+              <a:t>Investigate the bottleneck</a:t>
+            </a:r>
+          </a:p>
+          <a:p>
+            <a:pPr marL="342900" indent="-342900">
+              <a:buAutoNum type="arabicPeriod"/>
+            </a:pPr>
+            <a:r>
+              <a:rPr lang="en-US" dirty="0"/>
+              <a:t>Make sure that the sum of sampling effort across all communities &lt; sampling on the whole graph by IMM</a:t>
+            </a:r>
+          </a:p>
+          <a:p>
+            <a:pPr marL="342900" indent="-342900">
+              <a:buAutoNum type="arabicPeriod"/>
+            </a:pPr>
+            <a:r>
+              <a:rPr lang="en-US" dirty="0"/>
+              <a:t>Parallelize the heap update across communities</a:t>
+            </a:r>
+          </a:p>
+          <a:p>
+            <a:pPr marL="342900" indent="-342900">
+              <a:buAutoNum type="arabicPeriod"/>
+            </a:pPr>
+            <a:r>
+              <a:rPr lang="en-US" dirty="0"/>
+              <a:t>Redo the experiments after doing 1-3</a:t>
+            </a:r>
+          </a:p>
+          <a:p>
+            <a:pPr marL="342900" indent="-342900">
+              <a:buAutoNum type="arabicPeriod"/>
+            </a:pPr>
+            <a:r>
+              <a:rPr lang="en-US" dirty="0"/>
+              <a:t>Go for distributed approach if everything fails</a:t>
+            </a:r>
+            <a:endParaRPr lang="en-IN" dirty="0"/>
+          </a:p>
+        </p:txBody>
+      </p:sp>
+      <p:sp>
+        <p:nvSpPr>
+          <p:cNvPr id="3" name="TextBox 2">
+            <a:extLst>
+              <a:ext uri="{FF2B5EF4-FFF2-40B4-BE49-F238E27FC236}">
+                <a16:creationId xmlns:a16="http://schemas.microsoft.com/office/drawing/2014/main" id="{F151BBE9-CC04-4028-AC61-6DB46A206229}"/>
+              </a:ext>
+            </a:extLst>
+          </p:cNvPr>
+          <p:cNvSpPr txBox="1"/>
+          <p:nvPr/>
+        </p:nvSpPr>
+        <p:spPr>
+          <a:xfrm>
+            <a:off x="899513" y="3292221"/>
+            <a:ext cx="11302389" cy="2862322"/>
+          </a:xfrm>
+          <a:prstGeom prst="rect">
+            <a:avLst/>
+          </a:prstGeom>
+          <a:noFill/>
+        </p:spPr>
+        <p:txBody>
+          <a:bodyPr wrap="none" rtlCol="0">
+            <a:spAutoFit/>
+          </a:bodyPr>
+          <a:lstStyle/>
+          <a:p>
+            <a:r>
+              <a:rPr lang="en-US" dirty="0"/>
+              <a:t>To Do: </a:t>
+            </a:r>
+          </a:p>
+          <a:p>
+            <a:pPr marL="342900" indent="-342900">
+              <a:buAutoNum type="arabicPeriod"/>
+            </a:pPr>
+            <a:r>
+              <a:rPr lang="en-US" dirty="0"/>
+              <a:t>Same weighted graph as </a:t>
+            </a:r>
+            <a:r>
+              <a:rPr lang="en-US" dirty="0" err="1"/>
+              <a:t>i</a:t>
+            </a:r>
+            <a:r>
+              <a:rPr lang="en-US" dirty="0"/>
+              <a:t>/p to Grappolo and Louvain-IMM/IMM</a:t>
+            </a:r>
+          </a:p>
+          <a:p>
+            <a:pPr marL="342900" indent="-342900">
+              <a:buAutoNum type="arabicPeriod"/>
+            </a:pPr>
+            <a:r>
+              <a:rPr lang="en-US" dirty="0"/>
+              <a:t>Investigate Community graph to check which community is most connected to other</a:t>
+            </a:r>
+          </a:p>
+          <a:p>
+            <a:pPr marL="342900" indent="-342900">
+              <a:buAutoNum type="arabicPeriod"/>
+            </a:pPr>
+            <a:r>
+              <a:rPr lang="en-US" dirty="0"/>
+              <a:t>Budget K according to some rule:</a:t>
+            </a:r>
+          </a:p>
+          <a:p>
+            <a:pPr marL="800100" lvl="1" indent="-342900">
+              <a:buAutoNum type="arabicPeriod"/>
+            </a:pPr>
+            <a:r>
+              <a:rPr lang="en-US" dirty="0"/>
+              <a:t>Use Grappolo to partition into communities (edge weights are normalized fractions of inter community edges)</a:t>
+            </a:r>
+          </a:p>
+          <a:p>
+            <a:pPr marL="800100" lvl="1" indent="-342900">
+              <a:buAutoNum type="arabicPeriod"/>
+            </a:pPr>
+            <a:r>
+              <a:rPr lang="en-US" dirty="0"/>
+              <a:t>Use IMM (ask for n/2 seeds) to generate an order and ask 1 seed for the last half. </a:t>
+            </a:r>
+          </a:p>
+          <a:p>
+            <a:pPr marL="800100" lvl="1" indent="-342900">
+              <a:buAutoNum type="arabicPeriod"/>
+            </a:pPr>
+            <a:endParaRPr lang="en-US" dirty="0"/>
+          </a:p>
+          <a:p>
+            <a:pPr marL="342900" indent="-342900">
+              <a:buAutoNum type="arabicPeriod"/>
+            </a:pPr>
+            <a:r>
+              <a:rPr lang="en-US" dirty="0"/>
+              <a:t>For </a:t>
+            </a:r>
+            <a:r>
+              <a:rPr lang="en-US" dirty="0" err="1"/>
+              <a:t>metis</a:t>
+            </a:r>
+            <a:r>
+              <a:rPr lang="en-US" dirty="0"/>
+              <a:t>: K divided by #partitions as parameter to Sampling for each partition</a:t>
+            </a:r>
+          </a:p>
+          <a:p>
+            <a:pPr marL="800100" lvl="1" indent="-342900">
+              <a:buAutoNum type="arabicPeriod"/>
+            </a:pPr>
+            <a:endParaRPr lang="en-US" dirty="0"/>
+          </a:p>
+          <a:p>
+            <a:pPr marL="800100" lvl="1" indent="-342900">
+              <a:buAutoNum type="arabicPeriod"/>
+            </a:pPr>
+            <a:endParaRPr lang="en-US" dirty="0"/>
+          </a:p>
+        </p:txBody>
+      </p:sp>
+    </p:spTree>
+    <p:extLst>
+      <p:ext uri="{BB962C8B-B14F-4D97-AF65-F5344CB8AC3E}">
+        <p14:creationId xmlns:p14="http://schemas.microsoft.com/office/powerpoint/2010/main" val="2833896664"/>
+      </p:ext>
+    </p:extLst>
+  </p:cSld>
+  <p:clrMapOvr>
+    <a:masterClrMapping/>
+  </p:clrMapOvr>
+</p:sld>
+</file>
+
+<file path=ppt/slides/slide8.xml><?xml version="1.0" encoding="utf-8"?>
+<p:sld xmlns:a="http://schemas.openxmlformats.org/drawingml/2006/main" xmlns:r="http://schemas.openxmlformats.org/officeDocument/2006/relationships" xmlns:p="http://schemas.openxmlformats.org/presentationml/2006/main">
+  <p:cSld>
+    <p:spTree>
+      <p:nvGrpSpPr>
+        <p:cNvPr id="1" name=""/>
+        <p:cNvGrpSpPr/>
+        <p:nvPr/>
+      </p:nvGrpSpPr>
+      <p:grpSpPr>
+        <a:xfrm>
+          <a:off x="0" y="0"/>
+          <a:ext cx="0" cy="0"/>
+          <a:chOff x="0" y="0"/>
+          <a:chExt cx="0" cy="0"/>
+        </a:xfrm>
+      </p:grpSpPr>
+      <p:pic>
+        <p:nvPicPr>
+          <p:cNvPr id="3" name="Picture 2" descr="Chart, line chart&#10;&#10;Description automatically generated">
+            <a:extLst>
+              <a:ext uri="{FF2B5EF4-FFF2-40B4-BE49-F238E27FC236}">
+                <a16:creationId xmlns:a16="http://schemas.microsoft.com/office/drawing/2014/main" id="{05E55843-677F-4863-B106-654EF92757B2}"/>
+              </a:ext>
+            </a:extLst>
+          </p:cNvPr>
+          <p:cNvPicPr>
+            <a:picLocks noChangeAspect="1"/>
+          </p:cNvPicPr>
+          <p:nvPr/>
+        </p:nvPicPr>
+        <p:blipFill>
+          <a:blip r:embed="rId2">
+            <a:extLst>
+              <a:ext uri="{28A0092B-C50C-407E-A947-70E740481C1C}">
+                <a14:useLocalDpi xmlns:a14="http://schemas.microsoft.com/office/drawing/2010/main" val="0"/>
+              </a:ext>
+            </a:extLst>
+          </a:blip>
+          <a:stretch>
+            <a:fillRect/>
+          </a:stretch>
+        </p:blipFill>
+        <p:spPr>
+          <a:xfrm>
+            <a:off x="609589" y="1600196"/>
+            <a:ext cx="5486411" cy="3657607"/>
+          </a:xfrm>
+          <a:prstGeom prst="rect">
+            <a:avLst/>
+          </a:prstGeom>
+        </p:spPr>
+      </p:pic>
+      <p:pic>
+        <p:nvPicPr>
+          <p:cNvPr id="5" name="Picture 4" descr="Chart, line chart&#10;&#10;Description automatically generated">
+            <a:extLst>
+              <a:ext uri="{FF2B5EF4-FFF2-40B4-BE49-F238E27FC236}">
+                <a16:creationId xmlns:a16="http://schemas.microsoft.com/office/drawing/2014/main" id="{66A01539-7699-4149-8810-C4AFDE94ABEE}"/>
+              </a:ext>
+            </a:extLst>
+          </p:cNvPr>
+          <p:cNvPicPr>
+            <a:picLocks noChangeAspect="1"/>
+          </p:cNvPicPr>
+          <p:nvPr/>
+        </p:nvPicPr>
+        <p:blipFill>
+          <a:blip r:embed="rId3">
+            <a:extLst>
+              <a:ext uri="{28A0092B-C50C-407E-A947-70E740481C1C}">
+                <a14:useLocalDpi xmlns:a14="http://schemas.microsoft.com/office/drawing/2010/main" val="0"/>
+              </a:ext>
+            </a:extLst>
+          </a:blip>
+          <a:stretch>
+            <a:fillRect/>
+          </a:stretch>
+        </p:blipFill>
+        <p:spPr>
+          <a:xfrm>
+            <a:off x="6477734" y="1600196"/>
+            <a:ext cx="5486411" cy="3657607"/>
+          </a:xfrm>
+          <a:prstGeom prst="rect">
+            <a:avLst/>
+          </a:prstGeom>
+        </p:spPr>
+      </p:pic>
+      <p:sp>
+        <p:nvSpPr>
+          <p:cNvPr id="6" name="TextBox 5">
+            <a:extLst>
+              <a:ext uri="{FF2B5EF4-FFF2-40B4-BE49-F238E27FC236}">
+                <a16:creationId xmlns:a16="http://schemas.microsoft.com/office/drawing/2014/main" id="{FFD1F0DE-ACA5-458A-BDC0-3E2B3426A866}"/>
+              </a:ext>
+            </a:extLst>
+          </p:cNvPr>
+          <p:cNvSpPr txBox="1"/>
+          <p:nvPr/>
+        </p:nvSpPr>
+        <p:spPr>
+          <a:xfrm>
+            <a:off x="3629042" y="754602"/>
+            <a:ext cx="4933915" cy="646331"/>
+          </a:xfrm>
+          <a:prstGeom prst="rect">
+            <a:avLst/>
+          </a:prstGeom>
+          <a:noFill/>
+        </p:spPr>
+        <p:txBody>
+          <a:bodyPr wrap="none" rtlCol="0">
+            <a:spAutoFit/>
+          </a:bodyPr>
+          <a:lstStyle/>
+          <a:p>
+            <a:r>
+              <a:rPr lang="en-US" dirty="0"/>
+              <a:t>	           Expected Influence</a:t>
+            </a:r>
+          </a:p>
+          <a:p>
+            <a:r>
+              <a:rPr lang="en-US" dirty="0"/>
+              <a:t>Before (left) and After (right) Sampling Adjustment</a:t>
+            </a:r>
+            <a:endParaRPr lang="en-IN" dirty="0"/>
+          </a:p>
+        </p:txBody>
+      </p:sp>
+    </p:spTree>
+    <p:extLst>
+      <p:ext uri="{BB962C8B-B14F-4D97-AF65-F5344CB8AC3E}">
+        <p14:creationId xmlns:p14="http://schemas.microsoft.com/office/powerpoint/2010/main" val="4056155280"/>
+      </p:ext>
+    </p:extLst>
+  </p:cSld>
+  <p:clrMapOvr>
+    <a:masterClrMapping/>
+  </p:clrMapOvr>
+</p:sld>
+</file>
+
+<file path=ppt/slides/slide9.xml><?xml version="1.0" encoding="utf-8"?>
+<p:sld xmlns:a="http://schemas.openxmlformats.org/drawingml/2006/main" xmlns:r="http://schemas.openxmlformats.org/officeDocument/2006/relationships" xmlns:p="http://schemas.openxmlformats.org/presentationml/2006/main">
+  <p:cSld>
+    <p:spTree>
+      <p:nvGrpSpPr>
+        <p:cNvPr id="1" name=""/>
+        <p:cNvGrpSpPr/>
+        <p:nvPr/>
+      </p:nvGrpSpPr>
+      <p:grpSpPr>
+        <a:xfrm>
+          <a:off x="0" y="0"/>
+          <a:ext cx="0" cy="0"/>
+          <a:chOff x="0" y="0"/>
+          <a:chExt cx="0" cy="0"/>
+        </a:xfrm>
+      </p:grpSpPr>
+      <p:sp>
+        <p:nvSpPr>
+          <p:cNvPr id="6" name="TextBox 5">
+            <a:extLst>
+              <a:ext uri="{FF2B5EF4-FFF2-40B4-BE49-F238E27FC236}">
+                <a16:creationId xmlns:a16="http://schemas.microsoft.com/office/drawing/2014/main" id="{FFD1F0DE-ACA5-458A-BDC0-3E2B3426A866}"/>
+              </a:ext>
+            </a:extLst>
+          </p:cNvPr>
+          <p:cNvSpPr txBox="1"/>
+          <p:nvPr/>
+        </p:nvSpPr>
+        <p:spPr>
+          <a:xfrm>
+            <a:off x="3629042" y="754602"/>
+            <a:ext cx="4933915" cy="646331"/>
+          </a:xfrm>
+          <a:prstGeom prst="rect">
+            <a:avLst/>
+          </a:prstGeom>
+          <a:noFill/>
+        </p:spPr>
+        <p:txBody>
+          <a:bodyPr wrap="none" rtlCol="0">
+            <a:spAutoFit/>
+          </a:bodyPr>
+          <a:lstStyle/>
+          <a:p>
+            <a:r>
+              <a:rPr lang="en-US" dirty="0"/>
+              <a:t>	             Execution Time</a:t>
+            </a:r>
+          </a:p>
+          <a:p>
+            <a:r>
+              <a:rPr lang="en-US" dirty="0"/>
+              <a:t>Before (left) and After (right) Sampling Adjustment</a:t>
+            </a:r>
+            <a:endParaRPr lang="en-IN" dirty="0"/>
+          </a:p>
+        </p:txBody>
+      </p:sp>
+      <p:pic>
+        <p:nvPicPr>
+          <p:cNvPr id="4" name="Picture 3" descr="Chart&#10;&#10;Description automatically generated">
+            <a:extLst>
+              <a:ext uri="{FF2B5EF4-FFF2-40B4-BE49-F238E27FC236}">
+                <a16:creationId xmlns:a16="http://schemas.microsoft.com/office/drawing/2014/main" id="{C9B5E5B7-136B-48AC-8929-192A0C104902}"/>
+              </a:ext>
+            </a:extLst>
+          </p:cNvPr>
+          <p:cNvPicPr>
+            <a:picLocks noChangeAspect="1"/>
+          </p:cNvPicPr>
+          <p:nvPr/>
+        </p:nvPicPr>
+        <p:blipFill>
+          <a:blip r:embed="rId2">
+            <a:extLst>
+              <a:ext uri="{28A0092B-C50C-407E-A947-70E740481C1C}">
+                <a14:useLocalDpi xmlns:a14="http://schemas.microsoft.com/office/drawing/2010/main" val="0"/>
+              </a:ext>
+            </a:extLst>
+          </a:blip>
+          <a:stretch>
+            <a:fillRect/>
+          </a:stretch>
+        </p:blipFill>
+        <p:spPr>
+          <a:xfrm>
+            <a:off x="615506" y="1600196"/>
+            <a:ext cx="5486411" cy="3657607"/>
+          </a:xfrm>
+          <a:prstGeom prst="rect">
+            <a:avLst/>
+          </a:prstGeom>
+        </p:spPr>
+      </p:pic>
+      <p:pic>
+        <p:nvPicPr>
+          <p:cNvPr id="8" name="Picture 7" descr="Chart, bar chart&#10;&#10;Description automatically generated">
+            <a:extLst>
+              <a:ext uri="{FF2B5EF4-FFF2-40B4-BE49-F238E27FC236}">
+                <a16:creationId xmlns:a16="http://schemas.microsoft.com/office/drawing/2014/main" id="{A85D5371-D6CD-4356-BD61-5FB8E75F41E5}"/>
+              </a:ext>
+            </a:extLst>
+          </p:cNvPr>
+          <p:cNvPicPr>
+            <a:picLocks noChangeAspect="1"/>
+          </p:cNvPicPr>
+          <p:nvPr/>
+        </p:nvPicPr>
+        <p:blipFill>
+          <a:blip r:embed="rId3">
+            <a:extLst>
+              <a:ext uri="{28A0092B-C50C-407E-A947-70E740481C1C}">
+                <a14:useLocalDpi xmlns:a14="http://schemas.microsoft.com/office/drawing/2010/main" val="0"/>
+              </a:ext>
+            </a:extLst>
+          </a:blip>
+          <a:stretch>
+            <a:fillRect/>
+          </a:stretch>
+        </p:blipFill>
+        <p:spPr>
+          <a:xfrm>
+            <a:off x="6175893" y="1600196"/>
+            <a:ext cx="5486411" cy="3657607"/>
+          </a:xfrm>
+          <a:prstGeom prst="rect">
+            <a:avLst/>
+          </a:prstGeom>
+        </p:spPr>
+      </p:pic>
+    </p:spTree>
+    <p:extLst>
+      <p:ext uri="{BB962C8B-B14F-4D97-AF65-F5344CB8AC3E}">
+        <p14:creationId xmlns:p14="http://schemas.microsoft.com/office/powerpoint/2010/main" val="2132789210"/>
       </p:ext>
     </p:extLst>
   </p:cSld>

</xml_diff>